<commit_message>
EDA with Capstone Project 1
</commit_message>
<xml_diff>
--- a/Capstone Project 1/Capstone Project 1_Data Story.pptx
+++ b/Capstone Project 1/Capstone Project 1_Data Story.pptx
@@ -111,6 +111,11 @@
       </a:defRPr>
     </a:lvl9pPr>
   </p:defaultTextStyle>
+  <p:extLst>
+    <p:ext uri="{EFAFB233-063F-42B5-8137-9DF3F51BA10A}">
+      <p15:sldGuideLst xmlns:p15="http://schemas.microsoft.com/office/powerpoint/2012/main"/>
+    </p:ext>
+  </p:extLst>
 </p:presentation>
 </file>
 
@@ -261,7 +266,7 @@
           <a:p>
             <a:fld id="{A20CB58F-77F2-4A48-8FC2-5A04DD9706DD}" type="datetimeFigureOut">
               <a:rPr lang="en-US" smtClean="0"/>
-              <a:t>2/5/2019</a:t>
+              <a:t>2/15/2019</a:t>
             </a:fld>
             <a:endParaRPr lang="en-US"/>
           </a:p>
@@ -459,7 +464,7 @@
           <a:p>
             <a:fld id="{A20CB58F-77F2-4A48-8FC2-5A04DD9706DD}" type="datetimeFigureOut">
               <a:rPr lang="en-US" smtClean="0"/>
-              <a:t>2/5/2019</a:t>
+              <a:t>2/15/2019</a:t>
             </a:fld>
             <a:endParaRPr lang="en-US"/>
           </a:p>
@@ -667,7 +672,7 @@
           <a:p>
             <a:fld id="{A20CB58F-77F2-4A48-8FC2-5A04DD9706DD}" type="datetimeFigureOut">
               <a:rPr lang="en-US" smtClean="0"/>
-              <a:t>2/5/2019</a:t>
+              <a:t>2/15/2019</a:t>
             </a:fld>
             <a:endParaRPr lang="en-US"/>
           </a:p>
@@ -865,7 +870,7 @@
           <a:p>
             <a:fld id="{A20CB58F-77F2-4A48-8FC2-5A04DD9706DD}" type="datetimeFigureOut">
               <a:rPr lang="en-US" smtClean="0"/>
-              <a:t>2/5/2019</a:t>
+              <a:t>2/15/2019</a:t>
             </a:fld>
             <a:endParaRPr lang="en-US"/>
           </a:p>
@@ -1140,7 +1145,7 @@
           <a:p>
             <a:fld id="{A20CB58F-77F2-4A48-8FC2-5A04DD9706DD}" type="datetimeFigureOut">
               <a:rPr lang="en-US" smtClean="0"/>
-              <a:t>2/5/2019</a:t>
+              <a:t>2/15/2019</a:t>
             </a:fld>
             <a:endParaRPr lang="en-US"/>
           </a:p>
@@ -1405,7 +1410,7 @@
           <a:p>
             <a:fld id="{A20CB58F-77F2-4A48-8FC2-5A04DD9706DD}" type="datetimeFigureOut">
               <a:rPr lang="en-US" smtClean="0"/>
-              <a:t>2/5/2019</a:t>
+              <a:t>2/15/2019</a:t>
             </a:fld>
             <a:endParaRPr lang="en-US"/>
           </a:p>
@@ -1817,7 +1822,7 @@
           <a:p>
             <a:fld id="{A20CB58F-77F2-4A48-8FC2-5A04DD9706DD}" type="datetimeFigureOut">
               <a:rPr lang="en-US" smtClean="0"/>
-              <a:t>2/5/2019</a:t>
+              <a:t>2/15/2019</a:t>
             </a:fld>
             <a:endParaRPr lang="en-US"/>
           </a:p>
@@ -1958,7 +1963,7 @@
           <a:p>
             <a:fld id="{A20CB58F-77F2-4A48-8FC2-5A04DD9706DD}" type="datetimeFigureOut">
               <a:rPr lang="en-US" smtClean="0"/>
-              <a:t>2/5/2019</a:t>
+              <a:t>2/15/2019</a:t>
             </a:fld>
             <a:endParaRPr lang="en-US"/>
           </a:p>
@@ -2071,7 +2076,7 @@
           <a:p>
             <a:fld id="{A20CB58F-77F2-4A48-8FC2-5A04DD9706DD}" type="datetimeFigureOut">
               <a:rPr lang="en-US" smtClean="0"/>
-              <a:t>2/5/2019</a:t>
+              <a:t>2/15/2019</a:t>
             </a:fld>
             <a:endParaRPr lang="en-US"/>
           </a:p>
@@ -2382,7 +2387,7 @@
           <a:p>
             <a:fld id="{A20CB58F-77F2-4A48-8FC2-5A04DD9706DD}" type="datetimeFigureOut">
               <a:rPr lang="en-US" smtClean="0"/>
-              <a:t>2/5/2019</a:t>
+              <a:t>2/15/2019</a:t>
             </a:fld>
             <a:endParaRPr lang="en-US"/>
           </a:p>
@@ -2670,7 +2675,7 @@
           <a:p>
             <a:fld id="{A20CB58F-77F2-4A48-8FC2-5A04DD9706DD}" type="datetimeFigureOut">
               <a:rPr lang="en-US" smtClean="0"/>
-              <a:t>2/5/2019</a:t>
+              <a:t>2/15/2019</a:t>
             </a:fld>
             <a:endParaRPr lang="en-US"/>
           </a:p>
@@ -2911,7 +2916,7 @@
           <a:p>
             <a:fld id="{A20CB58F-77F2-4A48-8FC2-5A04DD9706DD}" type="datetimeFigureOut">
               <a:rPr lang="en-US" smtClean="0"/>
-              <a:t>2/5/2019</a:t>
+              <a:t>2/15/2019</a:t>
             </a:fld>
             <a:endParaRPr lang="en-US"/>
           </a:p>
@@ -3597,7 +3602,7 @@
         </p:blipFill>
         <p:spPr bwMode="auto">
           <a:xfrm>
-            <a:off x="0" y="0"/>
+            <a:off x="2831504" y="0"/>
             <a:ext cx="6528991" cy="6858000"/>
           </a:xfrm>
           <a:prstGeom prst="rect">
@@ -3676,7 +3681,7 @@
         </p:blipFill>
         <p:spPr bwMode="auto">
           <a:xfrm>
-            <a:off x="0" y="0"/>
+            <a:off x="2830882" y="0"/>
             <a:ext cx="6530236" cy="6858000"/>
           </a:xfrm>
           <a:prstGeom prst="rect">
@@ -3755,7 +3760,7 @@
         </p:blipFill>
         <p:spPr bwMode="auto">
           <a:xfrm>
-            <a:off x="0" y="0"/>
+            <a:off x="2830882" y="0"/>
             <a:ext cx="6530236" cy="6858000"/>
           </a:xfrm>
           <a:prstGeom prst="rect">
@@ -3832,7 +3837,7 @@
         </p:blipFill>
         <p:spPr bwMode="auto">
           <a:xfrm>
-            <a:off x="0" y="1286954"/>
+            <a:off x="3048000" y="1286954"/>
             <a:ext cx="6096000" cy="4284091"/>
           </a:xfrm>
           <a:prstGeom prst="rect">
@@ -3909,7 +3914,7 @@
         </p:blipFill>
         <p:spPr bwMode="auto">
           <a:xfrm>
-            <a:off x="0" y="1303020"/>
+            <a:off x="3048000" y="1303020"/>
             <a:ext cx="6096000" cy="4251960"/>
           </a:xfrm>
           <a:prstGeom prst="rect">

</xml_diff>